<commit_message>
A little cleanup on the slide master for module 2
</commit_message>
<xml_diff>
--- a/Slides/Module 2 -Object Oriented Programming in J.pptx
+++ b/Slides/Module 2 -Object Oriented Programming in J.pptx
@@ -4237,55 +4237,6 @@
           </a:prstGeom>
         </p:spPr>
       </p:pic>
-      <p:sp>
-        <p:nvSpPr>
-          <p:cNvPr id="10" name="Rectangle 9"/>
-          <p:cNvSpPr/>
-          <p:nvPr userDrawn="1"/>
-        </p:nvSpPr>
-        <p:spPr>
-          <a:xfrm>
-            <a:off x="2356" y="0"/>
-            <a:ext cx="45719" cy="6858000"/>
-          </a:xfrm>
-          <a:prstGeom prst="rect">
-            <a:avLst/>
-          </a:prstGeom>
-          <a:solidFill>
-            <a:schemeClr val="accent6">
-              <a:lumMod val="60000"/>
-              <a:lumOff val="40000"/>
-            </a:schemeClr>
-          </a:solidFill>
-          <a:ln>
-            <a:noFill/>
-          </a:ln>
-        </p:spPr>
-        <p:style>
-          <a:lnRef idx="2">
-            <a:schemeClr val="accent1">
-              <a:shade val="50000"/>
-            </a:schemeClr>
-          </a:lnRef>
-          <a:fillRef idx="1">
-            <a:schemeClr val="accent1"/>
-          </a:fillRef>
-          <a:effectRef idx="0">
-            <a:schemeClr val="accent1"/>
-          </a:effectRef>
-          <a:fontRef idx="minor">
-            <a:schemeClr val="lt1"/>
-          </a:fontRef>
-        </p:style>
-        <p:txBody>
-          <a:bodyPr rtlCol="0" anchor="ctr"/>
-          <a:lstStyle/>
-          <a:p>
-            <a:pPr algn="ctr"/>
-            <a:endParaRPr lang="en-US"/>
-          </a:p>
-        </p:txBody>
-      </p:sp>
     </p:spTree>
     <p:extLst>
       <p:ext uri="{BB962C8B-B14F-4D97-AF65-F5344CB8AC3E}">
@@ -4905,55 +4856,6 @@
           </a:prstGeom>
         </p:spPr>
       </p:pic>
-      <p:sp>
-        <p:nvSpPr>
-          <p:cNvPr id="10" name="Rectangle 9"/>
-          <p:cNvSpPr/>
-          <p:nvPr userDrawn="1"/>
-        </p:nvSpPr>
-        <p:spPr>
-          <a:xfrm>
-            <a:off x="2356" y="0"/>
-            <a:ext cx="45719" cy="6858000"/>
-          </a:xfrm>
-          <a:prstGeom prst="rect">
-            <a:avLst/>
-          </a:prstGeom>
-          <a:solidFill>
-            <a:schemeClr val="accent5">
-              <a:lumMod val="60000"/>
-              <a:lumOff val="40000"/>
-            </a:schemeClr>
-          </a:solidFill>
-          <a:ln>
-            <a:noFill/>
-          </a:ln>
-        </p:spPr>
-        <p:style>
-          <a:lnRef idx="2">
-            <a:schemeClr val="accent1">
-              <a:shade val="50000"/>
-            </a:schemeClr>
-          </a:lnRef>
-          <a:fillRef idx="1">
-            <a:schemeClr val="accent1"/>
-          </a:fillRef>
-          <a:effectRef idx="0">
-            <a:schemeClr val="accent1"/>
-          </a:effectRef>
-          <a:fontRef idx="minor">
-            <a:schemeClr val="lt1"/>
-          </a:fontRef>
-        </p:style>
-        <p:txBody>
-          <a:bodyPr rtlCol="0" anchor="ctr"/>
-          <a:lstStyle/>
-          <a:p>
-            <a:pPr algn="ctr"/>
-            <a:endParaRPr lang="en-US"/>
-          </a:p>
-        </p:txBody>
-      </p:sp>
     </p:spTree>
     <p:extLst>
       <p:ext uri="{BB962C8B-B14F-4D97-AF65-F5344CB8AC3E}">
@@ -5573,55 +5475,6 @@
           </a:prstGeom>
         </p:spPr>
       </p:pic>
-      <p:sp>
-        <p:nvSpPr>
-          <p:cNvPr id="10" name="Rectangle 9"/>
-          <p:cNvSpPr/>
-          <p:nvPr userDrawn="1"/>
-        </p:nvSpPr>
-        <p:spPr>
-          <a:xfrm>
-            <a:off x="2356" y="0"/>
-            <a:ext cx="45719" cy="6858000"/>
-          </a:xfrm>
-          <a:prstGeom prst="rect">
-            <a:avLst/>
-          </a:prstGeom>
-          <a:solidFill>
-            <a:schemeClr val="accent5">
-              <a:lumMod val="60000"/>
-              <a:lumOff val="40000"/>
-            </a:schemeClr>
-          </a:solidFill>
-          <a:ln>
-            <a:noFill/>
-          </a:ln>
-        </p:spPr>
-        <p:style>
-          <a:lnRef idx="2">
-            <a:schemeClr val="accent1">
-              <a:shade val="50000"/>
-            </a:schemeClr>
-          </a:lnRef>
-          <a:fillRef idx="1">
-            <a:schemeClr val="accent1"/>
-          </a:fillRef>
-          <a:effectRef idx="0">
-            <a:schemeClr val="accent1"/>
-          </a:effectRef>
-          <a:fontRef idx="minor">
-            <a:schemeClr val="lt1"/>
-          </a:fontRef>
-        </p:style>
-        <p:txBody>
-          <a:bodyPr rtlCol="0" anchor="ctr"/>
-          <a:lstStyle/>
-          <a:p>
-            <a:pPr algn="ctr"/>
-            <a:endParaRPr lang="en-US"/>
-          </a:p>
-        </p:txBody>
-      </p:sp>
     </p:spTree>
     <p:extLst>
       <p:ext uri="{BB962C8B-B14F-4D97-AF65-F5344CB8AC3E}">
@@ -6909,55 +6762,6 @@
           </a:prstGeom>
         </p:spPr>
       </p:pic>
-      <p:sp>
-        <p:nvSpPr>
-          <p:cNvPr id="10" name="Rectangle 9"/>
-          <p:cNvSpPr/>
-          <p:nvPr userDrawn="1"/>
-        </p:nvSpPr>
-        <p:spPr>
-          <a:xfrm>
-            <a:off x="2356" y="0"/>
-            <a:ext cx="45719" cy="6858000"/>
-          </a:xfrm>
-          <a:prstGeom prst="rect">
-            <a:avLst/>
-          </a:prstGeom>
-          <a:solidFill>
-            <a:schemeClr val="accent5">
-              <a:lumMod val="60000"/>
-              <a:lumOff val="40000"/>
-            </a:schemeClr>
-          </a:solidFill>
-          <a:ln>
-            <a:noFill/>
-          </a:ln>
-        </p:spPr>
-        <p:style>
-          <a:lnRef idx="2">
-            <a:schemeClr val="accent1">
-              <a:shade val="50000"/>
-            </a:schemeClr>
-          </a:lnRef>
-          <a:fillRef idx="1">
-            <a:schemeClr val="accent1"/>
-          </a:fillRef>
-          <a:effectRef idx="0">
-            <a:schemeClr val="accent1"/>
-          </a:effectRef>
-          <a:fontRef idx="minor">
-            <a:schemeClr val="lt1"/>
-          </a:fontRef>
-        </p:style>
-        <p:txBody>
-          <a:bodyPr rtlCol="0" anchor="ctr"/>
-          <a:lstStyle/>
-          <a:p>
-            <a:pPr algn="ctr"/>
-            <a:endParaRPr lang="en-US"/>
-          </a:p>
-        </p:txBody>
-      </p:sp>
     </p:spTree>
     <p:extLst>
       <p:ext uri="{BB962C8B-B14F-4D97-AF65-F5344CB8AC3E}">
@@ -7577,55 +7381,6 @@
           </a:prstGeom>
         </p:spPr>
       </p:pic>
-      <p:sp>
-        <p:nvSpPr>
-          <p:cNvPr id="10" name="Rectangle 9"/>
-          <p:cNvSpPr/>
-          <p:nvPr userDrawn="1"/>
-        </p:nvSpPr>
-        <p:spPr>
-          <a:xfrm>
-            <a:off x="2356" y="0"/>
-            <a:ext cx="45719" cy="6858000"/>
-          </a:xfrm>
-          <a:prstGeom prst="rect">
-            <a:avLst/>
-          </a:prstGeom>
-          <a:solidFill>
-            <a:schemeClr val="accent5">
-              <a:lumMod val="60000"/>
-              <a:lumOff val="40000"/>
-            </a:schemeClr>
-          </a:solidFill>
-          <a:ln>
-            <a:noFill/>
-          </a:ln>
-        </p:spPr>
-        <p:style>
-          <a:lnRef idx="2">
-            <a:schemeClr val="accent1">
-              <a:shade val="50000"/>
-            </a:schemeClr>
-          </a:lnRef>
-          <a:fillRef idx="1">
-            <a:schemeClr val="accent1"/>
-          </a:fillRef>
-          <a:effectRef idx="0">
-            <a:schemeClr val="accent1"/>
-          </a:effectRef>
-          <a:fontRef idx="minor">
-            <a:schemeClr val="lt1"/>
-          </a:fontRef>
-        </p:style>
-        <p:txBody>
-          <a:bodyPr rtlCol="0" anchor="ctr"/>
-          <a:lstStyle/>
-          <a:p>
-            <a:pPr algn="ctr"/>
-            <a:endParaRPr lang="en-US"/>
-          </a:p>
-        </p:txBody>
-      </p:sp>
     </p:spTree>
     <p:extLst>
       <p:ext uri="{BB962C8B-B14F-4D97-AF65-F5344CB8AC3E}">
@@ -7825,55 +7580,6 @@
           </a:prstGeom>
         </p:spPr>
       </p:pic>
-      <p:sp>
-        <p:nvSpPr>
-          <p:cNvPr id="7" name="Rectangle 6"/>
-          <p:cNvSpPr/>
-          <p:nvPr userDrawn="1"/>
-        </p:nvSpPr>
-        <p:spPr>
-          <a:xfrm>
-            <a:off x="2356" y="0"/>
-            <a:ext cx="45719" cy="6858000"/>
-          </a:xfrm>
-          <a:prstGeom prst="rect">
-            <a:avLst/>
-          </a:prstGeom>
-          <a:solidFill>
-            <a:schemeClr val="accent6">
-              <a:lumMod val="60000"/>
-              <a:lumOff val="40000"/>
-            </a:schemeClr>
-          </a:solidFill>
-          <a:ln>
-            <a:noFill/>
-          </a:ln>
-        </p:spPr>
-        <p:style>
-          <a:lnRef idx="2">
-            <a:schemeClr val="accent1">
-              <a:shade val="50000"/>
-            </a:schemeClr>
-          </a:lnRef>
-          <a:fillRef idx="1">
-            <a:schemeClr val="accent1"/>
-          </a:fillRef>
-          <a:effectRef idx="0">
-            <a:schemeClr val="accent1"/>
-          </a:effectRef>
-          <a:fontRef idx="minor">
-            <a:schemeClr val="lt1"/>
-          </a:fontRef>
-        </p:style>
-        <p:txBody>
-          <a:bodyPr rtlCol="0" anchor="ctr"/>
-          <a:lstStyle/>
-          <a:p>
-            <a:pPr algn="ctr"/>
-            <a:endParaRPr lang="en-US"/>
-          </a:p>
-        </p:txBody>
-      </p:sp>
     </p:spTree>
     <p:extLst>
       <p:ext uri="{BB962C8B-B14F-4D97-AF65-F5344CB8AC3E}">
@@ -8057,55 +7763,6 @@
           </a:prstGeom>
         </p:spPr>
       </p:pic>
-      <p:sp>
-        <p:nvSpPr>
-          <p:cNvPr id="7" name="Rectangle 6"/>
-          <p:cNvSpPr/>
-          <p:nvPr userDrawn="1"/>
-        </p:nvSpPr>
-        <p:spPr>
-          <a:xfrm>
-            <a:off x="2356" y="0"/>
-            <a:ext cx="45719" cy="6858000"/>
-          </a:xfrm>
-          <a:prstGeom prst="rect">
-            <a:avLst/>
-          </a:prstGeom>
-          <a:solidFill>
-            <a:schemeClr val="accent5">
-              <a:lumMod val="60000"/>
-              <a:lumOff val="40000"/>
-            </a:schemeClr>
-          </a:solidFill>
-          <a:ln>
-            <a:noFill/>
-          </a:ln>
-        </p:spPr>
-        <p:style>
-          <a:lnRef idx="2">
-            <a:schemeClr val="accent1">
-              <a:shade val="50000"/>
-            </a:schemeClr>
-          </a:lnRef>
-          <a:fillRef idx="1">
-            <a:schemeClr val="accent1"/>
-          </a:fillRef>
-          <a:effectRef idx="0">
-            <a:schemeClr val="accent1"/>
-          </a:effectRef>
-          <a:fontRef idx="minor">
-            <a:schemeClr val="lt1"/>
-          </a:fontRef>
-        </p:style>
-        <p:txBody>
-          <a:bodyPr rtlCol="0" anchor="ctr"/>
-          <a:lstStyle/>
-          <a:p>
-            <a:pPr algn="ctr"/>
-            <a:endParaRPr lang="en-US"/>
-          </a:p>
-        </p:txBody>
-      </p:sp>
     </p:spTree>
     <p:extLst>
       <p:ext uri="{BB962C8B-B14F-4D97-AF65-F5344CB8AC3E}">
@@ -8289,55 +7946,6 @@
           </a:prstGeom>
         </p:spPr>
       </p:pic>
-      <p:sp>
-        <p:nvSpPr>
-          <p:cNvPr id="7" name="Rectangle 6"/>
-          <p:cNvSpPr/>
-          <p:nvPr userDrawn="1"/>
-        </p:nvSpPr>
-        <p:spPr>
-          <a:xfrm>
-            <a:off x="2356" y="0"/>
-            <a:ext cx="45719" cy="6858000"/>
-          </a:xfrm>
-          <a:prstGeom prst="rect">
-            <a:avLst/>
-          </a:prstGeom>
-          <a:solidFill>
-            <a:schemeClr val="accent5">
-              <a:lumMod val="60000"/>
-              <a:lumOff val="40000"/>
-            </a:schemeClr>
-          </a:solidFill>
-          <a:ln>
-            <a:noFill/>
-          </a:ln>
-        </p:spPr>
-        <p:style>
-          <a:lnRef idx="2">
-            <a:schemeClr val="accent1">
-              <a:shade val="50000"/>
-            </a:schemeClr>
-          </a:lnRef>
-          <a:fillRef idx="1">
-            <a:schemeClr val="accent1"/>
-          </a:fillRef>
-          <a:effectRef idx="0">
-            <a:schemeClr val="accent1"/>
-          </a:effectRef>
-          <a:fontRef idx="minor">
-            <a:schemeClr val="lt1"/>
-          </a:fontRef>
-        </p:style>
-        <p:txBody>
-          <a:bodyPr rtlCol="0" anchor="ctr"/>
-          <a:lstStyle/>
-          <a:p>
-            <a:pPr algn="ctr"/>
-            <a:endParaRPr lang="en-US"/>
-          </a:p>
-        </p:txBody>
-      </p:sp>
     </p:spTree>
     <p:extLst>
       <p:ext uri="{BB962C8B-B14F-4D97-AF65-F5344CB8AC3E}">
@@ -8521,55 +8129,6 @@
           </a:prstGeom>
         </p:spPr>
       </p:pic>
-      <p:sp>
-        <p:nvSpPr>
-          <p:cNvPr id="7" name="Rectangle 6"/>
-          <p:cNvSpPr/>
-          <p:nvPr userDrawn="1"/>
-        </p:nvSpPr>
-        <p:spPr>
-          <a:xfrm>
-            <a:off x="2356" y="0"/>
-            <a:ext cx="45719" cy="6858000"/>
-          </a:xfrm>
-          <a:prstGeom prst="rect">
-            <a:avLst/>
-          </a:prstGeom>
-          <a:solidFill>
-            <a:schemeClr val="accent5">
-              <a:lumMod val="60000"/>
-              <a:lumOff val="40000"/>
-            </a:schemeClr>
-          </a:solidFill>
-          <a:ln>
-            <a:noFill/>
-          </a:ln>
-        </p:spPr>
-        <p:style>
-          <a:lnRef idx="2">
-            <a:schemeClr val="accent1">
-              <a:shade val="50000"/>
-            </a:schemeClr>
-          </a:lnRef>
-          <a:fillRef idx="1">
-            <a:schemeClr val="accent1"/>
-          </a:fillRef>
-          <a:effectRef idx="0">
-            <a:schemeClr val="accent1"/>
-          </a:effectRef>
-          <a:fontRef idx="minor">
-            <a:schemeClr val="lt1"/>
-          </a:fontRef>
-        </p:style>
-        <p:txBody>
-          <a:bodyPr rtlCol="0" anchor="ctr"/>
-          <a:lstStyle/>
-          <a:p>
-            <a:pPr algn="ctr"/>
-            <a:endParaRPr lang="en-US"/>
-          </a:p>
-        </p:txBody>
-      </p:sp>
     </p:spTree>
     <p:extLst>
       <p:ext uri="{BB962C8B-B14F-4D97-AF65-F5344CB8AC3E}">
@@ -8753,55 +8312,6 @@
           </a:prstGeom>
         </p:spPr>
       </p:pic>
-      <p:sp>
-        <p:nvSpPr>
-          <p:cNvPr id="7" name="Rectangle 6"/>
-          <p:cNvSpPr/>
-          <p:nvPr userDrawn="1"/>
-        </p:nvSpPr>
-        <p:spPr>
-          <a:xfrm>
-            <a:off x="2356" y="0"/>
-            <a:ext cx="45719" cy="6858000"/>
-          </a:xfrm>
-          <a:prstGeom prst="rect">
-            <a:avLst/>
-          </a:prstGeom>
-          <a:solidFill>
-            <a:schemeClr val="accent5">
-              <a:lumMod val="60000"/>
-              <a:lumOff val="40000"/>
-            </a:schemeClr>
-          </a:solidFill>
-          <a:ln>
-            <a:noFill/>
-          </a:ln>
-        </p:spPr>
-        <p:style>
-          <a:lnRef idx="2">
-            <a:schemeClr val="accent1">
-              <a:shade val="50000"/>
-            </a:schemeClr>
-          </a:lnRef>
-          <a:fillRef idx="1">
-            <a:schemeClr val="accent1"/>
-          </a:fillRef>
-          <a:effectRef idx="0">
-            <a:schemeClr val="accent1"/>
-          </a:effectRef>
-          <a:fontRef idx="minor">
-            <a:schemeClr val="lt1"/>
-          </a:fontRef>
-        </p:style>
-        <p:txBody>
-          <a:bodyPr rtlCol="0" anchor="ctr"/>
-          <a:lstStyle/>
-          <a:p>
-            <a:pPr algn="ctr"/>
-            <a:endParaRPr lang="en-US"/>
-          </a:p>
-        </p:txBody>
-      </p:sp>
     </p:spTree>
     <p:extLst>
       <p:ext uri="{BB962C8B-B14F-4D97-AF65-F5344CB8AC3E}">
@@ -8985,55 +8495,6 @@
           </a:prstGeom>
         </p:spPr>
       </p:pic>
-      <p:sp>
-        <p:nvSpPr>
-          <p:cNvPr id="7" name="Rectangle 6"/>
-          <p:cNvSpPr/>
-          <p:nvPr userDrawn="1"/>
-        </p:nvSpPr>
-        <p:spPr>
-          <a:xfrm>
-            <a:off x="2356" y="0"/>
-            <a:ext cx="45719" cy="6858000"/>
-          </a:xfrm>
-          <a:prstGeom prst="rect">
-            <a:avLst/>
-          </a:prstGeom>
-          <a:solidFill>
-            <a:schemeClr val="accent5">
-              <a:lumMod val="60000"/>
-              <a:lumOff val="40000"/>
-            </a:schemeClr>
-          </a:solidFill>
-          <a:ln>
-            <a:noFill/>
-          </a:ln>
-        </p:spPr>
-        <p:style>
-          <a:lnRef idx="2">
-            <a:schemeClr val="accent1">
-              <a:shade val="50000"/>
-            </a:schemeClr>
-          </a:lnRef>
-          <a:fillRef idx="1">
-            <a:schemeClr val="accent1"/>
-          </a:fillRef>
-          <a:effectRef idx="0">
-            <a:schemeClr val="accent1"/>
-          </a:effectRef>
-          <a:fontRef idx="minor">
-            <a:schemeClr val="lt1"/>
-          </a:fontRef>
-        </p:style>
-        <p:txBody>
-          <a:bodyPr rtlCol="0" anchor="ctr"/>
-          <a:lstStyle/>
-          <a:p>
-            <a:pPr algn="ctr"/>
-            <a:endParaRPr lang="en-US"/>
-          </a:p>
-        </p:txBody>
-      </p:sp>
     </p:spTree>
     <p:extLst>
       <p:ext uri="{BB962C8B-B14F-4D97-AF65-F5344CB8AC3E}">
@@ -9178,55 +8639,6 @@
           </a:p>
         </p:txBody>
       </p:sp>
-      <p:sp>
-        <p:nvSpPr>
-          <p:cNvPr id="9" name="Rectangle 8"/>
-          <p:cNvSpPr/>
-          <p:nvPr userDrawn="1"/>
-        </p:nvSpPr>
-        <p:spPr>
-          <a:xfrm>
-            <a:off x="2356" y="0"/>
-            <a:ext cx="45719" cy="6858000"/>
-          </a:xfrm>
-          <a:prstGeom prst="rect">
-            <a:avLst/>
-          </a:prstGeom>
-          <a:solidFill>
-            <a:schemeClr val="accent6">
-              <a:lumMod val="60000"/>
-              <a:lumOff val="40000"/>
-            </a:schemeClr>
-          </a:solidFill>
-          <a:ln>
-            <a:noFill/>
-          </a:ln>
-        </p:spPr>
-        <p:style>
-          <a:lnRef idx="2">
-            <a:schemeClr val="accent1">
-              <a:shade val="50000"/>
-            </a:schemeClr>
-          </a:lnRef>
-          <a:fillRef idx="1">
-            <a:schemeClr val="accent1"/>
-          </a:fillRef>
-          <a:effectRef idx="0">
-            <a:schemeClr val="accent1"/>
-          </a:effectRef>
-          <a:fontRef idx="minor">
-            <a:schemeClr val="lt1"/>
-          </a:fontRef>
-        </p:style>
-        <p:txBody>
-          <a:bodyPr rtlCol="0" anchor="ctr"/>
-          <a:lstStyle/>
-          <a:p>
-            <a:pPr algn="ctr"/>
-            <a:endParaRPr lang="en-US"/>
-          </a:p>
-        </p:txBody>
-      </p:sp>
     </p:spTree>
     <p:extLst>
       <p:ext uri="{BB962C8B-B14F-4D97-AF65-F5344CB8AC3E}">
@@ -9368,55 +8780,6 @@
               <a:t>Fifth level</a:t>
             </a:r>
             <a:endParaRPr lang="en-US" dirty="0"/>
-          </a:p>
-        </p:txBody>
-      </p:sp>
-      <p:sp>
-        <p:nvSpPr>
-          <p:cNvPr id="9" name="Rectangle 8"/>
-          <p:cNvSpPr/>
-          <p:nvPr userDrawn="1"/>
-        </p:nvSpPr>
-        <p:spPr>
-          <a:xfrm>
-            <a:off x="2356" y="0"/>
-            <a:ext cx="45719" cy="6858000"/>
-          </a:xfrm>
-          <a:prstGeom prst="rect">
-            <a:avLst/>
-          </a:prstGeom>
-          <a:solidFill>
-            <a:schemeClr val="accent6">
-              <a:lumMod val="60000"/>
-              <a:lumOff val="40000"/>
-            </a:schemeClr>
-          </a:solidFill>
-          <a:ln>
-            <a:noFill/>
-          </a:ln>
-        </p:spPr>
-        <p:style>
-          <a:lnRef idx="2">
-            <a:schemeClr val="accent1">
-              <a:shade val="50000"/>
-            </a:schemeClr>
-          </a:lnRef>
-          <a:fillRef idx="1">
-            <a:schemeClr val="accent1"/>
-          </a:fillRef>
-          <a:effectRef idx="0">
-            <a:schemeClr val="accent1"/>
-          </a:effectRef>
-          <a:fontRef idx="minor">
-            <a:schemeClr val="lt1"/>
-          </a:fontRef>
-        </p:style>
-        <p:txBody>
-          <a:bodyPr rtlCol="0" anchor="ctr"/>
-          <a:lstStyle/>
-          <a:p>
-            <a:pPr algn="ctr"/>
-            <a:endParaRPr lang="en-US"/>
           </a:p>
         </p:txBody>
       </p:sp>
@@ -10232,55 +9595,6 @@
           </a:p>
         </p:txBody>
       </p:sp>
-      <p:sp>
-        <p:nvSpPr>
-          <p:cNvPr id="9" name="Rectangle 8"/>
-          <p:cNvSpPr/>
-          <p:nvPr userDrawn="1"/>
-        </p:nvSpPr>
-        <p:spPr>
-          <a:xfrm>
-            <a:off x="2356" y="0"/>
-            <a:ext cx="45719" cy="6858000"/>
-          </a:xfrm>
-          <a:prstGeom prst="rect">
-            <a:avLst/>
-          </a:prstGeom>
-          <a:solidFill>
-            <a:schemeClr val="accent6">
-              <a:lumMod val="60000"/>
-              <a:lumOff val="40000"/>
-            </a:schemeClr>
-          </a:solidFill>
-          <a:ln>
-            <a:noFill/>
-          </a:ln>
-        </p:spPr>
-        <p:style>
-          <a:lnRef idx="2">
-            <a:schemeClr val="accent1">
-              <a:shade val="50000"/>
-            </a:schemeClr>
-          </a:lnRef>
-          <a:fillRef idx="1">
-            <a:schemeClr val="accent1"/>
-          </a:fillRef>
-          <a:effectRef idx="0">
-            <a:schemeClr val="accent1"/>
-          </a:effectRef>
-          <a:fontRef idx="minor">
-            <a:schemeClr val="lt1"/>
-          </a:fontRef>
-        </p:style>
-        <p:txBody>
-          <a:bodyPr rtlCol="0" anchor="ctr"/>
-          <a:lstStyle/>
-          <a:p>
-            <a:pPr algn="ctr"/>
-            <a:endParaRPr lang="en-US"/>
-          </a:p>
-        </p:txBody>
-      </p:sp>
     </p:spTree>
     <p:extLst>
       <p:ext uri="{BB962C8B-B14F-4D97-AF65-F5344CB8AC3E}">
@@ -10420,55 +9734,6 @@
           </a:p>
         </p:txBody>
       </p:sp>
-      <p:sp>
-        <p:nvSpPr>
-          <p:cNvPr id="4" name="Rectangle 3"/>
-          <p:cNvSpPr/>
-          <p:nvPr userDrawn="1"/>
-        </p:nvSpPr>
-        <p:spPr>
-          <a:xfrm>
-            <a:off x="2356" y="0"/>
-            <a:ext cx="45719" cy="6858000"/>
-          </a:xfrm>
-          <a:prstGeom prst="rect">
-            <a:avLst/>
-          </a:prstGeom>
-          <a:solidFill>
-            <a:schemeClr val="accent5">
-              <a:lumMod val="60000"/>
-              <a:lumOff val="40000"/>
-            </a:schemeClr>
-          </a:solidFill>
-          <a:ln>
-            <a:noFill/>
-          </a:ln>
-        </p:spPr>
-        <p:style>
-          <a:lnRef idx="2">
-            <a:schemeClr val="accent1">
-              <a:shade val="50000"/>
-            </a:schemeClr>
-          </a:lnRef>
-          <a:fillRef idx="1">
-            <a:schemeClr val="accent1"/>
-          </a:fillRef>
-          <a:effectRef idx="0">
-            <a:schemeClr val="accent1"/>
-          </a:effectRef>
-          <a:fontRef idx="minor">
-            <a:schemeClr val="lt1"/>
-          </a:fontRef>
-        </p:style>
-        <p:txBody>
-          <a:bodyPr rtlCol="0" anchor="ctr"/>
-          <a:lstStyle/>
-          <a:p>
-            <a:pPr algn="ctr"/>
-            <a:endParaRPr lang="en-US"/>
-          </a:p>
-        </p:txBody>
-      </p:sp>
     </p:spTree>
     <p:extLst>
       <p:ext uri="{BB962C8B-B14F-4D97-AF65-F5344CB8AC3E}">
@@ -10608,55 +9873,6 @@
           </a:p>
         </p:txBody>
       </p:sp>
-      <p:sp>
-        <p:nvSpPr>
-          <p:cNvPr id="4" name="Rectangle 3"/>
-          <p:cNvSpPr/>
-          <p:nvPr userDrawn="1"/>
-        </p:nvSpPr>
-        <p:spPr>
-          <a:xfrm>
-            <a:off x="2356" y="0"/>
-            <a:ext cx="45719" cy="6858000"/>
-          </a:xfrm>
-          <a:prstGeom prst="rect">
-            <a:avLst/>
-          </a:prstGeom>
-          <a:solidFill>
-            <a:schemeClr val="accent5">
-              <a:lumMod val="60000"/>
-              <a:lumOff val="40000"/>
-            </a:schemeClr>
-          </a:solidFill>
-          <a:ln>
-            <a:noFill/>
-          </a:ln>
-        </p:spPr>
-        <p:style>
-          <a:lnRef idx="2">
-            <a:schemeClr val="accent1">
-              <a:shade val="50000"/>
-            </a:schemeClr>
-          </a:lnRef>
-          <a:fillRef idx="1">
-            <a:schemeClr val="accent1"/>
-          </a:fillRef>
-          <a:effectRef idx="0">
-            <a:schemeClr val="accent1"/>
-          </a:effectRef>
-          <a:fontRef idx="minor">
-            <a:schemeClr val="lt1"/>
-          </a:fontRef>
-        </p:style>
-        <p:txBody>
-          <a:bodyPr rtlCol="0" anchor="ctr"/>
-          <a:lstStyle/>
-          <a:p>
-            <a:pPr algn="ctr"/>
-            <a:endParaRPr lang="en-US"/>
-          </a:p>
-        </p:txBody>
-      </p:sp>
     </p:spTree>
     <p:extLst>
       <p:ext uri="{BB962C8B-B14F-4D97-AF65-F5344CB8AC3E}">
@@ -10796,55 +10012,6 @@
           </a:p>
         </p:txBody>
       </p:sp>
-      <p:sp>
-        <p:nvSpPr>
-          <p:cNvPr id="4" name="Rectangle 3"/>
-          <p:cNvSpPr/>
-          <p:nvPr userDrawn="1"/>
-        </p:nvSpPr>
-        <p:spPr>
-          <a:xfrm>
-            <a:off x="2356" y="0"/>
-            <a:ext cx="45719" cy="6858000"/>
-          </a:xfrm>
-          <a:prstGeom prst="rect">
-            <a:avLst/>
-          </a:prstGeom>
-          <a:solidFill>
-            <a:schemeClr val="accent5">
-              <a:lumMod val="60000"/>
-              <a:lumOff val="40000"/>
-            </a:schemeClr>
-          </a:solidFill>
-          <a:ln>
-            <a:noFill/>
-          </a:ln>
-        </p:spPr>
-        <p:style>
-          <a:lnRef idx="2">
-            <a:schemeClr val="accent1">
-              <a:shade val="50000"/>
-            </a:schemeClr>
-          </a:lnRef>
-          <a:fillRef idx="1">
-            <a:schemeClr val="accent1"/>
-          </a:fillRef>
-          <a:effectRef idx="0">
-            <a:schemeClr val="accent1"/>
-          </a:effectRef>
-          <a:fontRef idx="minor">
-            <a:schemeClr val="lt1"/>
-          </a:fontRef>
-        </p:style>
-        <p:txBody>
-          <a:bodyPr rtlCol="0" anchor="ctr"/>
-          <a:lstStyle/>
-          <a:p>
-            <a:pPr algn="ctr"/>
-            <a:endParaRPr lang="en-US"/>
-          </a:p>
-        </p:txBody>
-      </p:sp>
     </p:spTree>
     <p:extLst>
       <p:ext uri="{BB962C8B-B14F-4D97-AF65-F5344CB8AC3E}">
@@ -10984,55 +10151,6 @@
           </a:p>
         </p:txBody>
       </p:sp>
-      <p:sp>
-        <p:nvSpPr>
-          <p:cNvPr id="4" name="Rectangle 3"/>
-          <p:cNvSpPr/>
-          <p:nvPr userDrawn="1"/>
-        </p:nvSpPr>
-        <p:spPr>
-          <a:xfrm>
-            <a:off x="2356" y="0"/>
-            <a:ext cx="45719" cy="6858000"/>
-          </a:xfrm>
-          <a:prstGeom prst="rect">
-            <a:avLst/>
-          </a:prstGeom>
-          <a:solidFill>
-            <a:schemeClr val="accent5">
-              <a:lumMod val="60000"/>
-              <a:lumOff val="40000"/>
-            </a:schemeClr>
-          </a:solidFill>
-          <a:ln>
-            <a:noFill/>
-          </a:ln>
-        </p:spPr>
-        <p:style>
-          <a:lnRef idx="2">
-            <a:schemeClr val="accent1">
-              <a:shade val="50000"/>
-            </a:schemeClr>
-          </a:lnRef>
-          <a:fillRef idx="1">
-            <a:schemeClr val="accent1"/>
-          </a:fillRef>
-          <a:effectRef idx="0">
-            <a:schemeClr val="accent1"/>
-          </a:effectRef>
-          <a:fontRef idx="minor">
-            <a:schemeClr val="lt1"/>
-          </a:fontRef>
-        </p:style>
-        <p:txBody>
-          <a:bodyPr rtlCol="0" anchor="ctr"/>
-          <a:lstStyle/>
-          <a:p>
-            <a:pPr algn="ctr"/>
-            <a:endParaRPr lang="en-US"/>
-          </a:p>
-        </p:txBody>
-      </p:sp>
     </p:spTree>
     <p:extLst>
       <p:ext uri="{BB962C8B-B14F-4D97-AF65-F5344CB8AC3E}">
@@ -11172,55 +10290,6 @@
           </a:p>
         </p:txBody>
       </p:sp>
-      <p:sp>
-        <p:nvSpPr>
-          <p:cNvPr id="4" name="Rectangle 3"/>
-          <p:cNvSpPr/>
-          <p:nvPr userDrawn="1"/>
-        </p:nvSpPr>
-        <p:spPr>
-          <a:xfrm>
-            <a:off x="2356" y="0"/>
-            <a:ext cx="45719" cy="6858000"/>
-          </a:xfrm>
-          <a:prstGeom prst="rect">
-            <a:avLst/>
-          </a:prstGeom>
-          <a:solidFill>
-            <a:schemeClr val="accent5">
-              <a:lumMod val="60000"/>
-              <a:lumOff val="40000"/>
-            </a:schemeClr>
-          </a:solidFill>
-          <a:ln>
-            <a:noFill/>
-          </a:ln>
-        </p:spPr>
-        <p:style>
-          <a:lnRef idx="2">
-            <a:schemeClr val="accent1">
-              <a:shade val="50000"/>
-            </a:schemeClr>
-          </a:lnRef>
-          <a:fillRef idx="1">
-            <a:schemeClr val="accent1"/>
-          </a:fillRef>
-          <a:effectRef idx="0">
-            <a:schemeClr val="accent1"/>
-          </a:effectRef>
-          <a:fontRef idx="minor">
-            <a:schemeClr val="lt1"/>
-          </a:fontRef>
-        </p:style>
-        <p:txBody>
-          <a:bodyPr rtlCol="0" anchor="ctr"/>
-          <a:lstStyle/>
-          <a:p>
-            <a:pPr algn="ctr"/>
-            <a:endParaRPr lang="en-US"/>
-          </a:p>
-        </p:txBody>
-      </p:sp>
     </p:spTree>
     <p:extLst>
       <p:ext uri="{BB962C8B-B14F-4D97-AF65-F5344CB8AC3E}">
@@ -11360,55 +10429,6 @@
           </a:p>
         </p:txBody>
       </p:sp>
-      <p:sp>
-        <p:nvSpPr>
-          <p:cNvPr id="4" name="Rectangle 3"/>
-          <p:cNvSpPr/>
-          <p:nvPr userDrawn="1"/>
-        </p:nvSpPr>
-        <p:spPr>
-          <a:xfrm>
-            <a:off x="2356" y="0"/>
-            <a:ext cx="45719" cy="6858000"/>
-          </a:xfrm>
-          <a:prstGeom prst="rect">
-            <a:avLst/>
-          </a:prstGeom>
-          <a:solidFill>
-            <a:schemeClr val="accent5">
-              <a:lumMod val="60000"/>
-              <a:lumOff val="40000"/>
-            </a:schemeClr>
-          </a:solidFill>
-          <a:ln>
-            <a:noFill/>
-          </a:ln>
-        </p:spPr>
-        <p:style>
-          <a:lnRef idx="2">
-            <a:schemeClr val="accent1">
-              <a:shade val="50000"/>
-            </a:schemeClr>
-          </a:lnRef>
-          <a:fillRef idx="1">
-            <a:schemeClr val="accent1"/>
-          </a:fillRef>
-          <a:effectRef idx="0">
-            <a:schemeClr val="accent1"/>
-          </a:effectRef>
-          <a:fontRef idx="minor">
-            <a:schemeClr val="lt1"/>
-          </a:fontRef>
-        </p:style>
-        <p:txBody>
-          <a:bodyPr rtlCol="0" anchor="ctr"/>
-          <a:lstStyle/>
-          <a:p>
-            <a:pPr algn="ctr"/>
-            <a:endParaRPr lang="en-US"/>
-          </a:p>
-        </p:txBody>
-      </p:sp>
     </p:spTree>
     <p:extLst>
       <p:ext uri="{BB962C8B-B14F-4D97-AF65-F5344CB8AC3E}">
@@ -11548,55 +10568,6 @@
           </a:p>
         </p:txBody>
       </p:sp>
-      <p:sp>
-        <p:nvSpPr>
-          <p:cNvPr id="4" name="Rectangle 3"/>
-          <p:cNvSpPr/>
-          <p:nvPr userDrawn="1"/>
-        </p:nvSpPr>
-        <p:spPr>
-          <a:xfrm>
-            <a:off x="2356" y="0"/>
-            <a:ext cx="45719" cy="6858000"/>
-          </a:xfrm>
-          <a:prstGeom prst="rect">
-            <a:avLst/>
-          </a:prstGeom>
-          <a:solidFill>
-            <a:schemeClr val="accent5">
-              <a:lumMod val="60000"/>
-              <a:lumOff val="40000"/>
-            </a:schemeClr>
-          </a:solidFill>
-          <a:ln>
-            <a:noFill/>
-          </a:ln>
-        </p:spPr>
-        <p:style>
-          <a:lnRef idx="2">
-            <a:schemeClr val="accent1">
-              <a:shade val="50000"/>
-            </a:schemeClr>
-          </a:lnRef>
-          <a:fillRef idx="1">
-            <a:schemeClr val="accent1"/>
-          </a:fillRef>
-          <a:effectRef idx="0">
-            <a:schemeClr val="accent1"/>
-          </a:effectRef>
-          <a:fontRef idx="minor">
-            <a:schemeClr val="lt1"/>
-          </a:fontRef>
-        </p:style>
-        <p:txBody>
-          <a:bodyPr rtlCol="0" anchor="ctr"/>
-          <a:lstStyle/>
-          <a:p>
-            <a:pPr algn="ctr"/>
-            <a:endParaRPr lang="en-US"/>
-          </a:p>
-        </p:txBody>
-      </p:sp>
     </p:spTree>
     <p:extLst>
       <p:ext uri="{BB962C8B-B14F-4D97-AF65-F5344CB8AC3E}">
@@ -11736,55 +10707,6 @@
           </a:p>
         </p:txBody>
       </p:sp>
-      <p:sp>
-        <p:nvSpPr>
-          <p:cNvPr id="4" name="Rectangle 3"/>
-          <p:cNvSpPr/>
-          <p:nvPr userDrawn="1"/>
-        </p:nvSpPr>
-        <p:spPr>
-          <a:xfrm>
-            <a:off x="2356" y="0"/>
-            <a:ext cx="45719" cy="6858000"/>
-          </a:xfrm>
-          <a:prstGeom prst="rect">
-            <a:avLst/>
-          </a:prstGeom>
-          <a:solidFill>
-            <a:schemeClr val="accent5">
-              <a:lumMod val="60000"/>
-              <a:lumOff val="40000"/>
-            </a:schemeClr>
-          </a:solidFill>
-          <a:ln>
-            <a:noFill/>
-          </a:ln>
-        </p:spPr>
-        <p:style>
-          <a:lnRef idx="2">
-            <a:schemeClr val="accent1">
-              <a:shade val="50000"/>
-            </a:schemeClr>
-          </a:lnRef>
-          <a:fillRef idx="1">
-            <a:schemeClr val="accent1"/>
-          </a:fillRef>
-          <a:effectRef idx="0">
-            <a:schemeClr val="accent1"/>
-          </a:effectRef>
-          <a:fontRef idx="minor">
-            <a:schemeClr val="lt1"/>
-          </a:fontRef>
-        </p:style>
-        <p:txBody>
-          <a:bodyPr rtlCol="0" anchor="ctr"/>
-          <a:lstStyle/>
-          <a:p>
-            <a:pPr algn="ctr"/>
-            <a:endParaRPr lang="en-US"/>
-          </a:p>
-        </p:txBody>
-      </p:sp>
     </p:spTree>
     <p:extLst>
       <p:ext uri="{BB962C8B-B14F-4D97-AF65-F5344CB8AC3E}">
@@ -11921,55 +10843,6 @@
               <a:t>Fifth level</a:t>
             </a:r>
             <a:endParaRPr lang="en-US" dirty="0"/>
-          </a:p>
-        </p:txBody>
-      </p:sp>
-      <p:sp>
-        <p:nvSpPr>
-          <p:cNvPr id="4" name="Rectangle 3"/>
-          <p:cNvSpPr/>
-          <p:nvPr userDrawn="1"/>
-        </p:nvSpPr>
-        <p:spPr>
-          <a:xfrm>
-            <a:off x="2356" y="0"/>
-            <a:ext cx="45719" cy="6858000"/>
-          </a:xfrm>
-          <a:prstGeom prst="rect">
-            <a:avLst/>
-          </a:prstGeom>
-          <a:solidFill>
-            <a:schemeClr val="accent5">
-              <a:lumMod val="60000"/>
-              <a:lumOff val="40000"/>
-            </a:schemeClr>
-          </a:solidFill>
-          <a:ln>
-            <a:noFill/>
-          </a:ln>
-        </p:spPr>
-        <p:style>
-          <a:lnRef idx="2">
-            <a:schemeClr val="accent1">
-              <a:shade val="50000"/>
-            </a:schemeClr>
-          </a:lnRef>
-          <a:fillRef idx="1">
-            <a:schemeClr val="accent1"/>
-          </a:fillRef>
-          <a:effectRef idx="0">
-            <a:schemeClr val="accent1"/>
-          </a:effectRef>
-          <a:fontRef idx="minor">
-            <a:schemeClr val="lt1"/>
-          </a:fontRef>
-        </p:style>
-        <p:txBody>
-          <a:bodyPr rtlCol="0" anchor="ctr"/>
-          <a:lstStyle/>
-          <a:p>
-            <a:pPr algn="ctr"/>
-            <a:endParaRPr lang="en-US"/>
           </a:p>
         </p:txBody>
       </p:sp>
@@ -12344,55 +11217,6 @@
           </a:p>
         </p:txBody>
       </p:sp>
-      <p:sp>
-        <p:nvSpPr>
-          <p:cNvPr id="4" name="Rectangle 3"/>
-          <p:cNvSpPr/>
-          <p:nvPr userDrawn="1"/>
-        </p:nvSpPr>
-        <p:spPr>
-          <a:xfrm>
-            <a:off x="2356" y="0"/>
-            <a:ext cx="45719" cy="6858000"/>
-          </a:xfrm>
-          <a:prstGeom prst="rect">
-            <a:avLst/>
-          </a:prstGeom>
-          <a:solidFill>
-            <a:schemeClr val="accent5">
-              <a:lumMod val="60000"/>
-              <a:lumOff val="40000"/>
-            </a:schemeClr>
-          </a:solidFill>
-          <a:ln>
-            <a:noFill/>
-          </a:ln>
-        </p:spPr>
-        <p:style>
-          <a:lnRef idx="2">
-            <a:schemeClr val="accent1">
-              <a:shade val="50000"/>
-            </a:schemeClr>
-          </a:lnRef>
-          <a:fillRef idx="1">
-            <a:schemeClr val="accent1"/>
-          </a:fillRef>
-          <a:effectRef idx="0">
-            <a:schemeClr val="accent1"/>
-          </a:effectRef>
-          <a:fontRef idx="minor">
-            <a:schemeClr val="lt1"/>
-          </a:fontRef>
-        </p:style>
-        <p:txBody>
-          <a:bodyPr rtlCol="0" anchor="ctr"/>
-          <a:lstStyle/>
-          <a:p>
-            <a:pPr algn="ctr"/>
-            <a:endParaRPr lang="en-US"/>
-          </a:p>
-        </p:txBody>
-      </p:sp>
     </p:spTree>
     <p:extLst>
       <p:ext uri="{BB962C8B-B14F-4D97-AF65-F5344CB8AC3E}">
@@ -12532,55 +11356,6 @@
           </a:p>
         </p:txBody>
       </p:sp>
-      <p:sp>
-        <p:nvSpPr>
-          <p:cNvPr id="4" name="Rectangle 3"/>
-          <p:cNvSpPr/>
-          <p:nvPr userDrawn="1"/>
-        </p:nvSpPr>
-        <p:spPr>
-          <a:xfrm>
-            <a:off x="2356" y="0"/>
-            <a:ext cx="45719" cy="6858000"/>
-          </a:xfrm>
-          <a:prstGeom prst="rect">
-            <a:avLst/>
-          </a:prstGeom>
-          <a:solidFill>
-            <a:schemeClr val="accent5">
-              <a:lumMod val="60000"/>
-              <a:lumOff val="40000"/>
-            </a:schemeClr>
-          </a:solidFill>
-          <a:ln>
-            <a:noFill/>
-          </a:ln>
-        </p:spPr>
-        <p:style>
-          <a:lnRef idx="2">
-            <a:schemeClr val="accent1">
-              <a:shade val="50000"/>
-            </a:schemeClr>
-          </a:lnRef>
-          <a:fillRef idx="1">
-            <a:schemeClr val="accent1"/>
-          </a:fillRef>
-          <a:effectRef idx="0">
-            <a:schemeClr val="accent1"/>
-          </a:effectRef>
-          <a:fontRef idx="minor">
-            <a:schemeClr val="lt1"/>
-          </a:fontRef>
-        </p:style>
-        <p:txBody>
-          <a:bodyPr rtlCol="0" anchor="ctr"/>
-          <a:lstStyle/>
-          <a:p>
-            <a:pPr algn="ctr"/>
-            <a:endParaRPr lang="en-US"/>
-          </a:p>
-        </p:txBody>
-      </p:sp>
     </p:spTree>
     <p:extLst>
       <p:ext uri="{BB962C8B-B14F-4D97-AF65-F5344CB8AC3E}">
@@ -12720,55 +11495,6 @@
           </a:p>
         </p:txBody>
       </p:sp>
-      <p:sp>
-        <p:nvSpPr>
-          <p:cNvPr id="4" name="Rectangle 3"/>
-          <p:cNvSpPr/>
-          <p:nvPr userDrawn="1"/>
-        </p:nvSpPr>
-        <p:spPr>
-          <a:xfrm>
-            <a:off x="2356" y="0"/>
-            <a:ext cx="45719" cy="6858000"/>
-          </a:xfrm>
-          <a:prstGeom prst="rect">
-            <a:avLst/>
-          </a:prstGeom>
-          <a:solidFill>
-            <a:schemeClr val="accent5">
-              <a:lumMod val="60000"/>
-              <a:lumOff val="40000"/>
-            </a:schemeClr>
-          </a:solidFill>
-          <a:ln>
-            <a:noFill/>
-          </a:ln>
-        </p:spPr>
-        <p:style>
-          <a:lnRef idx="2">
-            <a:schemeClr val="accent1">
-              <a:shade val="50000"/>
-            </a:schemeClr>
-          </a:lnRef>
-          <a:fillRef idx="1">
-            <a:schemeClr val="accent1"/>
-          </a:fillRef>
-          <a:effectRef idx="0">
-            <a:schemeClr val="accent1"/>
-          </a:effectRef>
-          <a:fontRef idx="minor">
-            <a:schemeClr val="lt1"/>
-          </a:fontRef>
-        </p:style>
-        <p:txBody>
-          <a:bodyPr rtlCol="0" anchor="ctr"/>
-          <a:lstStyle/>
-          <a:p>
-            <a:pPr algn="ctr"/>
-            <a:endParaRPr lang="en-US"/>
-          </a:p>
-        </p:txBody>
-      </p:sp>
     </p:spTree>
     <p:extLst>
       <p:ext uri="{BB962C8B-B14F-4D97-AF65-F5344CB8AC3E}">
@@ -12908,55 +11634,6 @@
           </a:p>
         </p:txBody>
       </p:sp>
-      <p:sp>
-        <p:nvSpPr>
-          <p:cNvPr id="4" name="Rectangle 3"/>
-          <p:cNvSpPr/>
-          <p:nvPr userDrawn="1"/>
-        </p:nvSpPr>
-        <p:spPr>
-          <a:xfrm>
-            <a:off x="2356" y="0"/>
-            <a:ext cx="45719" cy="6858000"/>
-          </a:xfrm>
-          <a:prstGeom prst="rect">
-            <a:avLst/>
-          </a:prstGeom>
-          <a:solidFill>
-            <a:schemeClr val="accent5">
-              <a:lumMod val="60000"/>
-              <a:lumOff val="40000"/>
-            </a:schemeClr>
-          </a:solidFill>
-          <a:ln>
-            <a:noFill/>
-          </a:ln>
-        </p:spPr>
-        <p:style>
-          <a:lnRef idx="2">
-            <a:schemeClr val="accent1">
-              <a:shade val="50000"/>
-            </a:schemeClr>
-          </a:lnRef>
-          <a:fillRef idx="1">
-            <a:schemeClr val="accent1"/>
-          </a:fillRef>
-          <a:effectRef idx="0">
-            <a:schemeClr val="accent1"/>
-          </a:effectRef>
-          <a:fontRef idx="minor">
-            <a:schemeClr val="lt1"/>
-          </a:fontRef>
-        </p:style>
-        <p:txBody>
-          <a:bodyPr rtlCol="0" anchor="ctr"/>
-          <a:lstStyle/>
-          <a:p>
-            <a:pPr algn="ctr"/>
-            <a:endParaRPr lang="en-US"/>
-          </a:p>
-        </p:txBody>
-      </p:sp>
     </p:spTree>
     <p:extLst>
       <p:ext uri="{BB962C8B-B14F-4D97-AF65-F5344CB8AC3E}">
@@ -13197,55 +11874,6 @@
           </a:p>
         </p:txBody>
       </p:sp>
-      <p:sp>
-        <p:nvSpPr>
-          <p:cNvPr id="5" name="Rectangle 4"/>
-          <p:cNvSpPr/>
-          <p:nvPr userDrawn="1"/>
-        </p:nvSpPr>
-        <p:spPr>
-          <a:xfrm>
-            <a:off x="2356" y="0"/>
-            <a:ext cx="45719" cy="6858000"/>
-          </a:xfrm>
-          <a:prstGeom prst="rect">
-            <a:avLst/>
-          </a:prstGeom>
-          <a:solidFill>
-            <a:schemeClr val="accent6">
-              <a:lumMod val="60000"/>
-              <a:lumOff val="40000"/>
-            </a:schemeClr>
-          </a:solidFill>
-          <a:ln>
-            <a:noFill/>
-          </a:ln>
-        </p:spPr>
-        <p:style>
-          <a:lnRef idx="2">
-            <a:schemeClr val="accent1">
-              <a:shade val="50000"/>
-            </a:schemeClr>
-          </a:lnRef>
-          <a:fillRef idx="1">
-            <a:schemeClr val="accent1"/>
-          </a:fillRef>
-          <a:effectRef idx="0">
-            <a:schemeClr val="accent1"/>
-          </a:effectRef>
-          <a:fontRef idx="minor">
-            <a:schemeClr val="lt1"/>
-          </a:fontRef>
-        </p:style>
-        <p:txBody>
-          <a:bodyPr rtlCol="0" anchor="ctr"/>
-          <a:lstStyle/>
-          <a:p>
-            <a:pPr algn="ctr"/>
-            <a:endParaRPr lang="en-US"/>
-          </a:p>
-        </p:txBody>
-      </p:sp>
     </p:spTree>
     <p:extLst>
       <p:ext uri="{BB962C8B-B14F-4D97-AF65-F5344CB8AC3E}">
@@ -13482,55 +12110,6 @@
               <a:rPr lang="en-US" smtClean="0"/>
               <a:t>Click to edit Master title style</a:t>
             </a:r>
-            <a:endParaRPr lang="en-US"/>
-          </a:p>
-        </p:txBody>
-      </p:sp>
-      <p:sp>
-        <p:nvSpPr>
-          <p:cNvPr id="5" name="Rectangle 4"/>
-          <p:cNvSpPr/>
-          <p:nvPr userDrawn="1"/>
-        </p:nvSpPr>
-        <p:spPr>
-          <a:xfrm>
-            <a:off x="2356" y="0"/>
-            <a:ext cx="45719" cy="6858000"/>
-          </a:xfrm>
-          <a:prstGeom prst="rect">
-            <a:avLst/>
-          </a:prstGeom>
-          <a:solidFill>
-            <a:schemeClr val="accent5">
-              <a:lumMod val="60000"/>
-              <a:lumOff val="40000"/>
-            </a:schemeClr>
-          </a:solidFill>
-          <a:ln>
-            <a:noFill/>
-          </a:ln>
-        </p:spPr>
-        <p:style>
-          <a:lnRef idx="2">
-            <a:schemeClr val="accent1">
-              <a:shade val="50000"/>
-            </a:schemeClr>
-          </a:lnRef>
-          <a:fillRef idx="1">
-            <a:schemeClr val="accent1"/>
-          </a:fillRef>
-          <a:effectRef idx="0">
-            <a:schemeClr val="accent1"/>
-          </a:effectRef>
-          <a:fontRef idx="minor">
-            <a:schemeClr val="lt1"/>
-          </a:fontRef>
-        </p:style>
-        <p:txBody>
-          <a:bodyPr rtlCol="0" anchor="ctr"/>
-          <a:lstStyle/>
-          <a:p>
-            <a:pPr algn="ctr"/>
             <a:endParaRPr lang="en-US"/>
           </a:p>
         </p:txBody>
@@ -17101,7 +15680,6 @@
               <a:rPr lang="en-US" dirty="0" smtClean="0"/>
               <a:t>You will use these methods to also manipulate and change object properties</a:t>
             </a:r>
-            <a:endParaRPr lang="en-US" dirty="0" smtClean="0"/>
           </a:p>
         </p:txBody>
       </p:sp>
@@ -17943,11 +16521,7 @@
           <a:p>
             <a:r>
               <a:rPr lang="en-US" dirty="0" smtClean="0"/>
-              <a:t>Though private and public methods </a:t>
-            </a:r>
-            <a:r>
-              <a:rPr lang="en-US" dirty="0" smtClean="0"/>
-              <a:t>are not used in JavaScript to hide functionality, some methods we have discussed were made to help us with that issue:</a:t>
+              <a:t>Though private and public methods are not used in JavaScript to hide functionality, some methods we have discussed were made to help us with that issue:</a:t>
             </a:r>
           </a:p>
           <a:p>
@@ -18911,7 +17485,6 @@
               <a:rPr lang="en-US" dirty="0" smtClean="0"/>
               <a:t>Constructors</a:t>
             </a:r>
-            <a:endParaRPr lang="en-US" dirty="0" smtClean="0"/>
           </a:p>
           <a:p>
             <a:pPr fontAlgn="ctr"/>
@@ -18926,7 +17499,6 @@
               <a:rPr lang="en-US" dirty="0" smtClean="0"/>
               <a:t>Inheritance </a:t>
             </a:r>
-            <a:endParaRPr lang="en-US" dirty="0" smtClean="0"/>
           </a:p>
           <a:p>
             <a:pPr fontAlgn="ctr"/>
@@ -20610,9 +19182,12 @@
 </file>
 
 <file path=customXml/item1.xml><?xml version="1.0" encoding="utf-8"?>
-<p:properties xmlns:p="http://schemas.microsoft.com/office/2006/metadata/properties" xmlns:xsi="http://www.w3.org/2001/XMLSchema-instance" xmlns:pc="http://schemas.microsoft.com/office/infopath/2007/PartnerControls">
-  <documentManagement/>
-</p:properties>
+<?mso-contentType ?>
+<FormTemplates xmlns="http://schemas.microsoft.com/sharepoint/v3/contenttype/forms">
+  <Display>DocumentLibraryForm</Display>
+  <Edit>DocumentLibraryForm</Edit>
+  <New>DocumentLibraryForm</New>
+</FormTemplates>
 </file>
 
 <file path=customXml/item2.xml><?xml version="1.0" encoding="utf-8"?>
@@ -20756,26 +19331,15 @@
 </file>
 
 <file path=customXml/item3.xml><?xml version="1.0" encoding="utf-8"?>
-<?mso-contentType ?>
-<FormTemplates xmlns="http://schemas.microsoft.com/sharepoint/v3/contenttype/forms">
-  <Display>DocumentLibraryForm</Display>
-  <Edit>DocumentLibraryForm</Edit>
-  <New>DocumentLibraryForm</New>
-</FormTemplates>
+<p:properties xmlns:p="http://schemas.microsoft.com/office/2006/metadata/properties" xmlns:xsi="http://www.w3.org/2001/XMLSchema-instance" xmlns:pc="http://schemas.microsoft.com/office/infopath/2007/PartnerControls">
+  <documentManagement/>
+</p:properties>
 </file>
 
 <file path=customXml/itemProps1.xml><?xml version="1.0" encoding="utf-8"?>
-<ds:datastoreItem xmlns:ds="http://schemas.openxmlformats.org/officeDocument/2006/customXml" ds:itemID="{7025FDD9-4C58-4084-9F89-0E6ADD6FFF55}">
+<ds:datastoreItem xmlns:ds="http://schemas.openxmlformats.org/officeDocument/2006/customXml" ds:itemID="{B0CA13EC-1D3C-4D6F-8D1C-E8A452CFC79A}">
   <ds:schemaRefs>
-    <ds:schemaRef ds:uri="http://schemas.microsoft.com/office/2006/documentManagement/types"/>
-    <ds:schemaRef ds:uri="http://schemas.microsoft.com/office/infopath/2007/PartnerControls"/>
-    <ds:schemaRef ds:uri="http://purl.org/dc/elements/1.1/"/>
-    <ds:schemaRef ds:uri="http://schemas.microsoft.com/office/2006/metadata/properties"/>
-    <ds:schemaRef ds:uri="http://purl.org/dc/terms/"/>
-    <ds:schemaRef ds:uri="http://schemas.openxmlformats.org/package/2006/metadata/core-properties"/>
-    <ds:schemaRef ds:uri="e5a13ba8-98e3-4f23-a221-7ac9824aa662"/>
-    <ds:schemaRef ds:uri="http://www.w3.org/XML/1998/namespace"/>
-    <ds:schemaRef ds:uri="http://purl.org/dc/dcmitype/"/>
+    <ds:schemaRef ds:uri="http://schemas.microsoft.com/sharepoint/v3/contenttype/forms"/>
   </ds:schemaRefs>
 </ds:datastoreItem>
 </file>
@@ -20799,9 +19363,17 @@
 </file>
 
 <file path=customXml/itemProps3.xml><?xml version="1.0" encoding="utf-8"?>
-<ds:datastoreItem xmlns:ds="http://schemas.openxmlformats.org/officeDocument/2006/customXml" ds:itemID="{B0CA13EC-1D3C-4D6F-8D1C-E8A452CFC79A}">
+<ds:datastoreItem xmlns:ds="http://schemas.openxmlformats.org/officeDocument/2006/customXml" ds:itemID="{7025FDD9-4C58-4084-9F89-0E6ADD6FFF55}">
   <ds:schemaRefs>
-    <ds:schemaRef ds:uri="http://schemas.microsoft.com/sharepoint/v3/contenttype/forms"/>
+    <ds:schemaRef ds:uri="http://schemas.microsoft.com/office/2006/documentManagement/types"/>
+    <ds:schemaRef ds:uri="http://schemas.microsoft.com/office/infopath/2007/PartnerControls"/>
+    <ds:schemaRef ds:uri="http://purl.org/dc/elements/1.1/"/>
+    <ds:schemaRef ds:uri="http://schemas.microsoft.com/office/2006/metadata/properties"/>
+    <ds:schemaRef ds:uri="http://purl.org/dc/terms/"/>
+    <ds:schemaRef ds:uri="http://schemas.openxmlformats.org/package/2006/metadata/core-properties"/>
+    <ds:schemaRef ds:uri="e5a13ba8-98e3-4f23-a221-7ac9824aa662"/>
+    <ds:schemaRef ds:uri="http://www.w3.org/XML/1998/namespace"/>
+    <ds:schemaRef ds:uri="http://purl.org/dc/dcmitype/"/>
   </ds:schemaRefs>
 </ds:datastoreItem>
 </file>
</xml_diff>